<commit_message>
finished user related api and html test. Finished image upload tests.
</commit_message>
<xml_diff>
--- a/API.pptx
+++ b/API.pptx
@@ -2899,7 +2899,7 @@
         <a:spcBef>
           <a:spcPts val="1000"/>
         </a:spcBef>
-        <a:buFont typeface="Arial" charset="0"/>
+        <a:buFont typeface="Arial" panose="02080604020202020204" charset="0"/>
         <a:buChar char="•"/>
         <a:defRPr sz="2800" kern="1200">
           <a:solidFill>
@@ -2917,7 +2917,7 @@
         <a:spcBef>
           <a:spcPts val="500"/>
         </a:spcBef>
-        <a:buFont typeface="Arial" charset="0"/>
+        <a:buFont typeface="Arial" panose="02080604020202020204" charset="0"/>
         <a:buChar char="•"/>
         <a:defRPr sz="2400" kern="1200">
           <a:solidFill>
@@ -2935,7 +2935,7 @@
         <a:spcBef>
           <a:spcPts val="500"/>
         </a:spcBef>
-        <a:buFont typeface="Arial" charset="0"/>
+        <a:buFont typeface="Arial" panose="02080604020202020204" charset="0"/>
         <a:buChar char="•"/>
         <a:defRPr sz="2000" kern="1200">
           <a:solidFill>
@@ -2953,7 +2953,7 @@
         <a:spcBef>
           <a:spcPts val="500"/>
         </a:spcBef>
-        <a:buFont typeface="Arial" charset="0"/>
+        <a:buFont typeface="Arial" panose="02080604020202020204" charset="0"/>
         <a:buChar char="•"/>
         <a:defRPr sz="1800" kern="1200">
           <a:solidFill>
@@ -2971,7 +2971,7 @@
         <a:spcBef>
           <a:spcPts val="500"/>
         </a:spcBef>
-        <a:buFont typeface="Arial" charset="0"/>
+        <a:buFont typeface="Arial" panose="02080604020202020204" charset="0"/>
         <a:buChar char="•"/>
         <a:defRPr sz="1800" kern="1200">
           <a:solidFill>
@@ -2989,7 +2989,7 @@
         <a:spcBef>
           <a:spcPts val="500"/>
         </a:spcBef>
-        <a:buFont typeface="Arial" charset="0"/>
+        <a:buFont typeface="Arial" panose="02080604020202020204" charset="0"/>
         <a:buChar char="•"/>
         <a:defRPr sz="1800" kern="1200">
           <a:solidFill>
@@ -3007,7 +3007,7 @@
         <a:spcBef>
           <a:spcPts val="500"/>
         </a:spcBef>
-        <a:buFont typeface="Arial" charset="0"/>
+        <a:buFont typeface="Arial" panose="02080604020202020204" charset="0"/>
         <a:buChar char="•"/>
         <a:defRPr sz="1800" kern="1200">
           <a:solidFill>
@@ -3025,7 +3025,7 @@
         <a:spcBef>
           <a:spcPts val="500"/>
         </a:spcBef>
-        <a:buFont typeface="Arial" charset="0"/>
+        <a:buFont typeface="Arial" panose="02080604020202020204" charset="0"/>
         <a:buChar char="•"/>
         <a:defRPr sz="1800" kern="1200">
           <a:solidFill>
@@ -3043,7 +3043,7 @@
         <a:spcBef>
           <a:spcPts val="500"/>
         </a:spcBef>
-        <a:buFont typeface="Arial" charset="0"/>
+        <a:buFont typeface="Arial" panose="02080604020202020204" charset="0"/>
         <a:buChar char="•"/>
         <a:defRPr sz="1800" kern="1200">
           <a:solidFill>
@@ -3190,7 +3190,7 @@
           </a:bodyPr>
           <a:p>
             <a:pPr marL="285750" lvl="0" indent="-285750">
-              <a:buFont typeface="Arial" charset="0"/>
+              <a:buFont typeface="Arial" panose="02080604020202020204" charset="0"/>
               <a:buChar char="•"/>
             </a:pPr>
             <a:r>
@@ -3207,7 +3207,7 @@
           </a:p>
           <a:p>
             <a:pPr marL="285750" lvl="0" indent="-285750">
-              <a:buFont typeface="Arial" charset="0"/>
+              <a:buFont typeface="Arial" panose="02080604020202020204" charset="0"/>
               <a:buChar char="•"/>
             </a:pPr>
             <a:r>
@@ -3224,7 +3224,7 @@
           </a:p>
           <a:p>
             <a:pPr marL="285750" lvl="0" indent="-285750">
-              <a:buFont typeface="Arial" charset="0"/>
+              <a:buFont typeface="Arial" panose="02080604020202020204" charset="0"/>
               <a:buChar char="•"/>
             </a:pPr>
             <a:r>
@@ -3241,7 +3241,7 @@
           </a:p>
           <a:p>
             <a:pPr marL="285750" lvl="0" indent="-285750">
-              <a:buFont typeface="Arial" charset="0"/>
+              <a:buFont typeface="Arial" panose="02080604020202020204" charset="0"/>
               <a:buChar char="•"/>
             </a:pPr>
             <a:r>
@@ -3258,7 +3258,7 @@
           </a:p>
           <a:p>
             <a:pPr marL="285750" lvl="0" indent="-285750">
-              <a:buFont typeface="Arial" charset="0"/>
+              <a:buFont typeface="Arial" panose="02080604020202020204" charset="0"/>
               <a:buChar char="•"/>
             </a:pPr>
             <a:r>
@@ -3275,7 +3275,7 @@
           </a:p>
           <a:p>
             <a:pPr marL="285750" lvl="0" indent="-285750">
-              <a:buFont typeface="Arial" charset="0"/>
+              <a:buFont typeface="Arial" panose="02080604020202020204" charset="0"/>
               <a:buChar char="•"/>
             </a:pPr>
             <a:r>
@@ -3361,7 +3361,7 @@
                       </a:pPr>
                       <a:r>
                         <a:rPr lang="x-none"/>
-                        <a:t>URL: /user/add</a:t>
+                        <a:t>URL: "/api/usr_add"</a:t>
                       </a:r>
                       <a:endParaRPr lang="x-none"/>
                     </a:p>
@@ -3509,69 +3509,129 @@
                       </a:pPr>
                       <a:r>
                         <a:rPr lang="x-none"/>
-                        <a:t>    "UserInfo":{</a:t>
-                      </a:r>
-                      <a:endParaRPr lang="x-none"/>
-                    </a:p>
-                    <a:p>
-                      <a:pPr>
-                        <a:buNone/>
-                      </a:pPr>
-                      <a:r>
-                        <a:rPr lang="x-none"/>
+                        <a:t>    </a:t>
+                      </a:r>
+                      <a:r>
+                        <a:rPr lang="x-none" sz="1800">
+                          <a:sym typeface="+mn-ea"/>
+                        </a:rPr>
+                        <a:t>"UserInfo":{</a:t>
+                      </a:r>
+                      <a:endParaRPr lang="x-none" sz="1800">
+                        <a:sym typeface="+mn-ea"/>
+                      </a:endParaRPr>
+                    </a:p>
+                    <a:p>
+                      <a:pPr>
+                        <a:buNone/>
+                      </a:pPr>
+                      <a:r>
+                        <a:rPr lang="x-none" sz="1800">
+                          <a:sym typeface="+mn-ea"/>
+                        </a:rPr>
                         <a:t>        "ID":"usrid",</a:t>
                       </a:r>
-                      <a:endParaRPr lang="x-none"/>
-                    </a:p>
-                    <a:p>
-                      <a:pPr>
-                        <a:buNone/>
-                      </a:pPr>
-                      <a:r>
-                        <a:rPr lang="x-none"/>
+                      <a:endParaRPr lang="x-none" sz="1800">
+                        <a:sym typeface="+mn-ea"/>
+                      </a:endParaRPr>
+                    </a:p>
+                    <a:p>
+                      <a:pPr>
+                        <a:buNone/>
+                      </a:pPr>
+                      <a:r>
+                        <a:rPr lang="x-none" sz="1800">
+                          <a:sym typeface="+mn-ea"/>
+                        </a:rPr>
                         <a:t>        "name":"usrname",</a:t>
                       </a:r>
-                      <a:endParaRPr lang="x-none"/>
-                    </a:p>
-                    <a:p>
-                      <a:pPr>
-                        <a:buNone/>
-                      </a:pPr>
-                      <a:r>
-                        <a:rPr lang="x-none"/>
+                      <a:endParaRPr lang="x-none" sz="1800">
+                        <a:sym typeface="+mn-ea"/>
+                      </a:endParaRPr>
+                    </a:p>
+                    <a:p>
+                      <a:pPr>
+                        <a:buNone/>
+                      </a:pPr>
+                      <a:r>
+                        <a:rPr lang="x-none" sz="1800">
+                          <a:sym typeface="+mn-ea"/>
+                        </a:rPr>
                         <a:t>        "password":"psw",</a:t>
                       </a:r>
-                      <a:endParaRPr lang="x-none"/>
-                    </a:p>
-                    <a:p>
-                      <a:pPr>
-                        <a:buNone/>
-                      </a:pPr>
-                      <a:r>
-                        <a:rPr lang="x-none"/>
-                        <a:t>        "Phone":"13412341234",</a:t>
-                      </a:r>
-                      <a:endParaRPr lang="x-none"/>
-                    </a:p>
-                    <a:p>
-                      <a:pPr>
-                        <a:buNone/>
-                      </a:pPr>
-                      <a:r>
-                        <a:rPr lang="x-none"/>
-                        <a:t>        "Email":"a@a.com",</a:t>
-                      </a:r>
-                      <a:endParaRPr lang="x-none"/>
-                    </a:p>
-                    <a:p>
-                      <a:pPr>
-                        <a:buNone/>
-                      </a:pPr>
-                      <a:r>
-                        <a:rPr lang="x-none"/>
+                      <a:endParaRPr lang="x-none" sz="1800">
+                        <a:sym typeface="+mn-ea"/>
+                      </a:endParaRPr>
+                    </a:p>
+                    <a:p>
+                      <a:pPr>
+                        <a:buNone/>
+                      </a:pPr>
+                      <a:r>
+                        <a:rPr lang="x-none" sz="1800">
+                          <a:sym typeface="+mn-ea"/>
+                        </a:rPr>
+                        <a:t>        "phone":"13412341234",</a:t>
+                      </a:r>
+                      <a:endParaRPr lang="x-none" sz="1800">
+                        <a:sym typeface="+mn-ea"/>
+                      </a:endParaRPr>
+                    </a:p>
+                    <a:p>
+                      <a:pPr>
+                        <a:buNone/>
+                      </a:pPr>
+                      <a:r>
+                        <a:rPr lang="x-none" sz="1800">
+                          <a:sym typeface="+mn-ea"/>
+                        </a:rPr>
+                        <a:t>        "email":"a@a.com",</a:t>
+                      </a:r>
+                      <a:endParaRPr lang="x-none" sz="1800">
+                        <a:sym typeface="+mn-ea"/>
+                      </a:endParaRPr>
+                    </a:p>
+                    <a:p>
+                      <a:pPr>
+                        <a:buNone/>
+                      </a:pPr>
+                      <a:r>
+                        <a:rPr lang="x-none" sz="1800">
+                          <a:sym typeface="+mn-ea"/>
+                        </a:rPr>
+                        <a:t>        "photo":"imgid",</a:t>
+                      </a:r>
+                      <a:endParaRPr lang="x-none" sz="1800">
+                        <a:sym typeface="+mn-ea"/>
+                      </a:endParaRPr>
+                    </a:p>
+                    <a:p>
+                      <a:pPr>
+                        <a:buNone/>
+                      </a:pPr>
+                      <a:r>
+                        <a:rPr lang="x-none" sz="1800">
+                          <a:sym typeface="+mn-ea"/>
+                        </a:rPr>
+                        <a:t>        "nickname":"nickname"</a:t>
+                      </a:r>
+                      <a:endParaRPr lang="x-none" sz="1800">
+                        <a:sym typeface="+mn-ea"/>
+                      </a:endParaRPr>
+                    </a:p>
+                    <a:p>
+                      <a:pPr>
+                        <a:buNone/>
+                      </a:pPr>
+                      <a:r>
+                        <a:rPr lang="x-none" sz="1800">
+                          <a:sym typeface="+mn-ea"/>
+                        </a:rPr>
                         <a:t>    }</a:t>
                       </a:r>
-                      <a:endParaRPr lang="x-none"/>
+                      <a:endParaRPr lang="x-none" sz="1800">
+                        <a:sym typeface="+mn-ea"/>
+                      </a:endParaRPr>
                     </a:p>
                     <a:p>
                       <a:pPr>
@@ -3744,10 +3804,10 @@
                         <a:buNone/>
                       </a:pPr>
                       <a:r>
-                        <a:rPr lang="x-none"/>
+                        <a:rPr lang="x-none" sz="1600"/>
                         <a:t>UserProfileCange</a:t>
                       </a:r>
-                      <a:endParaRPr lang="x-none"/>
+                      <a:endParaRPr lang="x-none" sz="1600"/>
                     </a:p>
                   </a:txBody>
                   <a:tcPr/>
@@ -3765,10 +3825,10 @@
                         <a:buNone/>
                       </a:pPr>
                       <a:r>
-                        <a:rPr lang="x-none"/>
-                        <a:t>URL:  /user/change</a:t>
-                      </a:r>
-                      <a:endParaRPr lang="x-none"/>
+                        <a:rPr lang="x-none" sz="1600"/>
+                        <a:t>URL:  /api/usr_update</a:t>
+                      </a:r>
+                      <a:endParaRPr lang="x-none" sz="1600"/>
                     </a:p>
                   </a:txBody>
                   <a:tcPr/>
@@ -3781,10 +3841,10 @@
                         <a:buNone/>
                       </a:pPr>
                       <a:r>
-                        <a:rPr lang="x-none"/>
+                        <a:rPr lang="x-none" sz="1600"/>
                         <a:t>Method: POST</a:t>
                       </a:r>
-                      <a:endParaRPr lang="x-none"/>
+                      <a:endParaRPr lang="x-none" sz="1600"/>
                     </a:p>
                   </a:txBody>
                   <a:tcPr/>
@@ -3799,20 +3859,20 @@
                         <a:buNone/>
                       </a:pPr>
                       <a:r>
-                        <a:rPr lang="x-none"/>
+                        <a:rPr lang="x-none" sz="1600"/>
                         <a:t>param:</a:t>
                       </a:r>
-                      <a:endParaRPr lang="x-none"/>
-                    </a:p>
-                    <a:p>
-                      <a:pPr>
-                        <a:buNone/>
-                      </a:pPr>
-                      <a:r>
-                        <a:rPr lang="x-none"/>
+                      <a:endParaRPr lang="x-none" sz="1600"/>
+                    </a:p>
+                    <a:p>
+                      <a:pPr>
+                        <a:buNone/>
+                      </a:pPr>
+                      <a:r>
+                        <a:rPr lang="x-none" sz="1600"/>
                         <a:t>userProfile</a:t>
                       </a:r>
-                      <a:endParaRPr lang="x-none"/>
+                      <a:endParaRPr lang="x-none" sz="1600"/>
                     </a:p>
                   </a:txBody>
                   <a:tcPr/>
@@ -3825,20 +3885,20 @@
                         <a:buNone/>
                       </a:pPr>
                       <a:r>
-                        <a:rPr lang="x-none"/>
+                        <a:rPr lang="x-none" sz="1600"/>
                         <a:t>return</a:t>
                       </a:r>
-                      <a:endParaRPr lang="x-none"/>
-                    </a:p>
-                    <a:p>
-                      <a:pPr>
-                        <a:buNone/>
-                      </a:pPr>
-                      <a:r>
-                        <a:rPr lang="x-none"/>
+                      <a:endParaRPr lang="x-none" sz="1600"/>
+                    </a:p>
+                    <a:p>
+                      <a:pPr>
+                        <a:buNone/>
+                      </a:pPr>
+                      <a:r>
+                        <a:rPr lang="x-none" sz="1600"/>
                         <a:t>status</a:t>
                       </a:r>
-                      <a:endParaRPr lang="x-none"/>
+                      <a:endParaRPr lang="x-none" sz="1600"/>
                     </a:p>
                   </a:txBody>
                   <a:tcPr/>
@@ -3853,160 +3913,160 @@
                         <a:buNone/>
                       </a:pPr>
                       <a:r>
-                        <a:rPr lang="x-none"/>
+                        <a:rPr lang="x-none" sz="1600"/>
                         <a:t>paramExample:</a:t>
                       </a:r>
-                      <a:endParaRPr lang="x-none"/>
-                    </a:p>
-                    <a:p>
-                      <a:pPr>
-                        <a:buNone/>
-                      </a:pPr>
-                      <a:r>
-                        <a:rPr lang="x-none"/>
+                      <a:endParaRPr lang="x-none" sz="1600"/>
+                    </a:p>
+                    <a:p>
+                      <a:pPr>
+                        <a:buNone/>
+                      </a:pPr>
+                      <a:r>
+                        <a:rPr lang="x-none" sz="1600"/>
                         <a:t>{</a:t>
                       </a:r>
-                      <a:endParaRPr lang="x-none"/>
-                    </a:p>
-                    <a:p>
-                      <a:pPr>
-                        <a:buNone/>
-                      </a:pPr>
-                      <a:r>
-                        <a:rPr lang="x-none"/>
+                      <a:endParaRPr lang="x-none" sz="1600"/>
+                    </a:p>
+                    <a:p>
+                      <a:pPr>
+                        <a:buNone/>
+                      </a:pPr>
+                      <a:r>
+                        <a:rPr lang="x-none" sz="1600"/>
                         <a:t>    "MataData":{</a:t>
                       </a:r>
-                      <a:endParaRPr lang="x-none"/>
-                    </a:p>
-                    <a:p>
-                      <a:pPr>
-                        <a:buNone/>
-                      </a:pPr>
-                      <a:r>
-                        <a:rPr lang="x-none"/>
+                      <a:endParaRPr lang="x-none" sz="1600"/>
+                    </a:p>
+                    <a:p>
+                      <a:pPr>
+                        <a:buNone/>
+                      </a:pPr>
+                      <a:r>
+                        <a:rPr lang="x-none" sz="1600"/>
                         <a:t>        "timestamp":"002313123904"</a:t>
                       </a:r>
-                      <a:endParaRPr lang="x-none"/>
-                    </a:p>
-                    <a:p>
-                      <a:pPr>
-                        <a:buNone/>
-                      </a:pPr>
-                      <a:r>
-                        <a:rPr lang="x-none"/>
+                      <a:endParaRPr lang="x-none" sz="1600"/>
+                    </a:p>
+                    <a:p>
+                      <a:pPr>
+                        <a:buNone/>
+                      </a:pPr>
+                      <a:r>
+                        <a:rPr lang="x-none" sz="1600"/>
                         <a:t>    },</a:t>
                       </a:r>
-                      <a:endParaRPr lang="x-none"/>
-                    </a:p>
-                    <a:p>
-                      <a:pPr>
-                        <a:buNone/>
-                      </a:pPr>
-                      <a:r>
-                        <a:rPr lang="x-none"/>
-                        <a:t>    "token":"testToken",</a:t>
-                      </a:r>
-                      <a:endParaRPr lang="x-none"/>
-                    </a:p>
-                    <a:p>
-                      <a:pPr>
-                        <a:buNone/>
-                      </a:pPr>
-                      <a:r>
-                        <a:rPr lang="x-none"/>
+                      <a:endParaRPr lang="x-none" sz="1600"/>
+                    </a:p>
+                    <a:p>
+                      <a:pPr>
+                        <a:buNone/>
+                      </a:pPr>
+                      <a:r>
+                        <a:rPr lang="x-none" sz="1600"/>
                         <a:t>    "UserInfo":{</a:t>
                       </a:r>
-                      <a:endParaRPr lang="x-none"/>
-                    </a:p>
-                    <a:p>
-                      <a:pPr>
-                        <a:buNone/>
-                      </a:pPr>
-                      <a:r>
-                        <a:rPr lang="x-none"/>
+                      <a:endParaRPr lang="x-none" sz="1600"/>
+                    </a:p>
+                    <a:p>
+                      <a:pPr>
+                        <a:buNone/>
+                      </a:pPr>
+                      <a:r>
+                        <a:rPr lang="x-none" sz="1600"/>
                         <a:t>        "ID":"usrid",</a:t>
                       </a:r>
-                      <a:endParaRPr lang="x-none"/>
-                    </a:p>
-                    <a:p>
-                      <a:pPr>
-                        <a:buNone/>
-                      </a:pPr>
-                      <a:r>
-                        <a:rPr lang="x-none"/>
+                      <a:endParaRPr lang="x-none" sz="1600"/>
+                    </a:p>
+                    <a:p>
+                      <a:pPr>
+                        <a:buNone/>
+                      </a:pPr>
+                      <a:r>
+                        <a:rPr lang="x-none" sz="1600"/>
                         <a:t>        "name":"usrname",</a:t>
                       </a:r>
-                      <a:endParaRPr lang="x-none"/>
-                    </a:p>
-                    <a:p>
-                      <a:pPr>
-                        <a:buNone/>
-                      </a:pPr>
-                      <a:r>
-                        <a:rPr lang="x-none"/>
+                      <a:endParaRPr lang="x-none" sz="1600"/>
+                    </a:p>
+                    <a:p>
+                      <a:pPr>
+                        <a:buNone/>
+                      </a:pPr>
+                      <a:r>
+                        <a:rPr lang="x-none" sz="1600"/>
                         <a:t>        "password":"psw",</a:t>
                       </a:r>
-                      <a:endParaRPr lang="x-none"/>
-                    </a:p>
-                    <a:p>
-                      <a:pPr>
-                        <a:buNone/>
-                      </a:pPr>
-                      <a:r>
-                        <a:rPr lang="x-none"/>
-                        <a:t>        "Phone":"13412341234",</a:t>
-                      </a:r>
-                      <a:endParaRPr lang="x-none"/>
-                    </a:p>
-                    <a:p>
-                      <a:pPr>
-                        <a:buNone/>
-                      </a:pPr>
-                      <a:r>
-                        <a:rPr lang="x-none"/>
-                        <a:t>        "Email":"a@a.com",</a:t>
-                      </a:r>
-                      <a:endParaRPr lang="x-none"/>
-                    </a:p>
-                    <a:p>
-                      <a:pPr>
-                        <a:buNone/>
-                      </a:pPr>
-                      <a:r>
-                        <a:rPr lang="x-none"/>
-                        <a:t>        "Photo":"imgid"</a:t>
-                      </a:r>
-                      <a:endParaRPr lang="x-none"/>
-                    </a:p>
-                    <a:p>
-                      <a:pPr>
-                        <a:buNone/>
-                      </a:pPr>
-                      <a:r>
-                        <a:rPr lang="x-none"/>
+                      <a:endParaRPr lang="x-none" sz="1600"/>
+                    </a:p>
+                    <a:p>
+                      <a:pPr>
+                        <a:buNone/>
+                      </a:pPr>
+                      <a:r>
+                        <a:rPr lang="x-none" sz="1600"/>
+                        <a:t>        "phone":"13412341234",</a:t>
+                      </a:r>
+                      <a:endParaRPr lang="x-none" sz="1600"/>
+                    </a:p>
+                    <a:p>
+                      <a:pPr>
+                        <a:buNone/>
+                      </a:pPr>
+                      <a:r>
+                        <a:rPr lang="x-none" sz="1600"/>
+                        <a:t>        "email":"a@a.com",</a:t>
+                      </a:r>
+                      <a:endParaRPr lang="x-none" sz="1600"/>
+                    </a:p>
+                    <a:p>
+                      <a:pPr>
+                        <a:buNone/>
+                      </a:pPr>
+                      <a:r>
+                        <a:rPr lang="x-none" sz="1600"/>
+                        <a:t>        "photo":"imgid",</a:t>
+                      </a:r>
+                      <a:endParaRPr lang="x-none" sz="1600"/>
+                    </a:p>
+                    <a:p>
+                      <a:pPr>
+                        <a:buNone/>
+                      </a:pPr>
+                      <a:r>
+                        <a:rPr lang="x-none" sz="1600"/>
+                        <a:t>        "nickname":"nickname"</a:t>
+                      </a:r>
+                      <a:endParaRPr lang="x-none" sz="1600"/>
+                    </a:p>
+                    <a:p>
+                      <a:pPr>
+                        <a:buNone/>
+                      </a:pPr>
+                      <a:r>
+                        <a:rPr lang="x-none" sz="1600"/>
                         <a:t>    }</a:t>
                       </a:r>
-                      <a:endParaRPr lang="x-none"/>
-                    </a:p>
-                    <a:p>
-                      <a:pPr>
-                        <a:buNone/>
-                      </a:pPr>
-                      <a:r>
-                        <a:rPr lang="x-none"/>
+                      <a:endParaRPr lang="x-none" sz="1600"/>
+                    </a:p>
+                    <a:p>
+                      <a:pPr>
+                        <a:buNone/>
+                      </a:pPr>
+                      <a:r>
+                        <a:rPr lang="x-none" sz="1600"/>
                         <a:t>}</a:t>
                       </a:r>
-                      <a:endParaRPr lang="x-none"/>
-                    </a:p>
-                    <a:p>
-                      <a:pPr>
-                        <a:buNone/>
-                      </a:pPr>
-                      <a:r>
-                        <a:rPr lang="x-none"/>
+                      <a:endParaRPr lang="x-none" sz="1600"/>
+                    </a:p>
+                    <a:p>
+                      <a:pPr>
+                        <a:buNone/>
+                      </a:pPr>
+                      <a:r>
+                        <a:rPr lang="x-none" sz="1600"/>
                         <a:t>// all parameters in UserInfo are optional</a:t>
                       </a:r>
-                      <a:endParaRPr lang="x-none"/>
+                      <a:endParaRPr lang="x-none" sz="1600"/>
                     </a:p>
                   </a:txBody>
                   <a:tcPr/>
@@ -4019,100 +4079,100 @@
                         <a:buNone/>
                       </a:pPr>
                       <a:r>
-                        <a:rPr lang="x-none"/>
+                        <a:rPr lang="x-none" sz="1600"/>
                         <a:t>returnExample:</a:t>
                       </a:r>
-                      <a:endParaRPr lang="x-none"/>
-                    </a:p>
-                    <a:p>
-                      <a:pPr>
-                        <a:buNone/>
-                      </a:pPr>
-                      <a:r>
-                        <a:rPr lang="x-none"/>
+                      <a:endParaRPr lang="x-none" sz="1600"/>
+                    </a:p>
+                    <a:p>
+                      <a:pPr>
+                        <a:buNone/>
+                      </a:pPr>
+                      <a:r>
+                        <a:rPr lang="x-none" sz="1600"/>
                         <a:t>{</a:t>
                       </a:r>
-                      <a:endParaRPr lang="x-none"/>
-                    </a:p>
-                    <a:p>
-                      <a:pPr>
-                        <a:buNone/>
-                      </a:pPr>
-                      <a:r>
-                        <a:rPr lang="x-none"/>
+                      <a:endParaRPr lang="x-none" sz="1600"/>
+                    </a:p>
+                    <a:p>
+                      <a:pPr>
+                        <a:buNone/>
+                      </a:pPr>
+                      <a:r>
+                        <a:rPr lang="x-none" sz="1600"/>
                         <a:t>    "MataData":{</a:t>
                       </a:r>
-                      <a:endParaRPr lang="x-none"/>
-                    </a:p>
-                    <a:p>
-                      <a:pPr>
-                        <a:buNone/>
-                      </a:pPr>
-                      <a:r>
-                        <a:rPr lang="x-none"/>
+                      <a:endParaRPr lang="x-none" sz="1600"/>
+                    </a:p>
+                    <a:p>
+                      <a:pPr>
+                        <a:buNone/>
+                      </a:pPr>
+                      <a:r>
+                        <a:rPr lang="x-none" sz="1600"/>
                         <a:t>        "timestamp":"002313123904"</a:t>
                       </a:r>
-                      <a:endParaRPr lang="x-none"/>
-                    </a:p>
-                    <a:p>
-                      <a:pPr>
-                        <a:buNone/>
-                      </a:pPr>
-                      <a:r>
-                        <a:rPr lang="x-none"/>
+                      <a:endParaRPr lang="x-none" sz="1600"/>
+                    </a:p>
+                    <a:p>
+                      <a:pPr>
+                        <a:buNone/>
+                      </a:pPr>
+                      <a:r>
+                        <a:rPr lang="x-none" sz="1600"/>
                         <a:t>    },</a:t>
                       </a:r>
-                      <a:endParaRPr lang="x-none"/>
-                    </a:p>
-                    <a:p>
-                      <a:pPr>
-                        <a:buNone/>
-                      </a:pPr>
-                      <a:r>
-                        <a:rPr lang="x-none"/>
+                      <a:endParaRPr lang="x-none" sz="1600"/>
+                    </a:p>
+                    <a:p>
+                      <a:pPr>
+                        <a:buNone/>
+                      </a:pPr>
+                      <a:r>
+                        <a:rPr lang="x-none" sz="1600"/>
                         <a:t>    "Status":{</a:t>
                       </a:r>
-                      <a:endParaRPr lang="x-none"/>
-                    </a:p>
-                    <a:p>
-                      <a:pPr>
-                        <a:buNone/>
-                      </a:pPr>
-                      <a:r>
-                        <a:rPr lang="x-none"/>
+                      <a:endParaRPr lang="x-none" sz="1600"/>
+                    </a:p>
+                    <a:p>
+                      <a:pPr>
+                        <a:buNone/>
+                      </a:pPr>
+                      <a:r>
+                        <a:rPr lang="x-none" sz="1600"/>
                         <a:t>        "StatusCode":"OK",</a:t>
                       </a:r>
-                      <a:endParaRPr lang="x-none"/>
-                    </a:p>
-                    <a:p>
-                      <a:pPr>
-                        <a:buNone/>
-                      </a:pPr>
-                      <a:r>
-                        <a:rPr lang="x-none"/>
+                      <a:endParaRPr lang="x-none" sz="1600"/>
+                    </a:p>
+                    <a:p>
+                      <a:pPr>
+                        <a:buNone/>
+                      </a:pPr>
+                      <a:r>
+                        <a:rPr lang="x-none" sz="1600"/>
                         <a:t>        "ErrorMsg":"None"</a:t>
                       </a:r>
-                      <a:endParaRPr lang="x-none"/>
-                    </a:p>
-                    <a:p>
-                      <a:pPr>
-                        <a:buNone/>
-                      </a:pPr>
-                      <a:r>
-                        <a:rPr lang="x-none"/>
+                      <a:endParaRPr lang="x-none" sz="1600"/>
+                    </a:p>
+                    <a:p>
+                      <a:pPr>
+                        <a:buNone/>
+                      </a:pPr>
+                      <a:r>
+                        <a:rPr lang="x-none" sz="1600"/>
                         <a:t>    }</a:t>
                       </a:r>
-                      <a:endParaRPr lang="x-none"/>
-                    </a:p>
-                    <a:p>
-                      <a:pPr>
-                        <a:buNone/>
-                      </a:pPr>
-                      <a:r>
-                        <a:rPr lang="x-none"/>
+                      <a:endParaRPr lang="x-none" sz="1600"/>
+                    </a:p>
+                    <a:p>
+                      <a:pPr>
+                        <a:buNone/>
+                      </a:pPr>
+                      <a:r>
+                        <a:rPr lang="x-none" sz="1600"/>
                         <a:t>}</a:t>
                       </a:r>
-                      <a:endParaRPr lang="x-none"/>
+                      <a:endParaRPr lang="x-none" sz="1600"/>
                     </a:p>
                   </a:txBody>
                   <a:tcPr/>
@@ -5328,7 +5388,7 @@
                       </a:pPr>
                       <a:r>
                         <a:rPr lang="x-none"/>
-                        <a:t>    "MataData":{</a:t>
+                        <a:t>    "mataData":{</a:t>
                       </a:r>
                       <a:endParaRPr lang="x-none"/>
                     </a:p>
@@ -5368,7 +5428,7 @@
                       </a:pPr>
                       <a:r>
                         <a:rPr lang="x-none"/>
-                        <a:t>    "UserInfo":{</a:t>
+                        <a:t>    "userinfo":{</a:t>
                       </a:r>
                       <a:endParaRPr lang="x-none"/>
                     </a:p>
@@ -5725,7 +5785,17 @@
                       </a:pPr>
                       <a:r>
                         <a:rPr lang="x-none"/>
-                        <a:t>    "MataData":{</a:t>
+                        <a:t>    "</a:t>
+                      </a:r>
+                      <a:r>
+                        <a:rPr lang="x-none" sz="1800">
+                          <a:sym typeface="+mn-ea"/>
+                        </a:rPr>
+                        <a:t>mataData</a:t>
+                      </a:r>
+                      <a:r>
+                        <a:rPr lang="x-none"/>
+                        <a:t>":{</a:t>
                       </a:r>
                       <a:endParaRPr lang="x-none"/>
                     </a:p>

</xml_diff>